<commit_message>
Update Lecture 7 - Looking at ConstraintIB examples.pptx
</commit_message>
<xml_diff>
--- a/IBAMR Lectures/Lecture 7 - Looking at ConstraintIB examples.pptx
+++ b/IBAMR Lectures/Lecture 7 - Looking at ConstraintIB examples.pptx
@@ -126,6 +126,11 @@
       </a:defRPr>
     </a:lvl9pPr>
   </p:defaultTextStyle>
+  <p:extLst>
+    <p:ext uri="{EFAFB233-063F-42B5-8137-9DF3F51BA10A}">
+      <p15:sldGuideLst xmlns:p15="http://schemas.microsoft.com/office/powerpoint/2012/main"/>
+    </p:ext>
+  </p:extLst>
 </p:presentation>
 </file>
 
@@ -260,7 +265,7 @@
           <a:p>
             <a:fld id="{3F5CFE33-0AFF-40E2-955F-FBA2E212049C}" type="datetimeFigureOut">
               <a:rPr lang="en-US" smtClean="0"/>
-              <a:t>9/8/2020</a:t>
+              <a:t>9/9/2020</a:t>
             </a:fld>
             <a:endParaRPr lang="en-US"/>
           </a:p>
@@ -430,7 +435,7 @@
           <a:p>
             <a:fld id="{3F5CFE33-0AFF-40E2-955F-FBA2E212049C}" type="datetimeFigureOut">
               <a:rPr lang="en-US" smtClean="0"/>
-              <a:t>9/8/2020</a:t>
+              <a:t>9/9/2020</a:t>
             </a:fld>
             <a:endParaRPr lang="en-US"/>
           </a:p>
@@ -610,7 +615,7 @@
           <a:p>
             <a:fld id="{3F5CFE33-0AFF-40E2-955F-FBA2E212049C}" type="datetimeFigureOut">
               <a:rPr lang="en-US" smtClean="0"/>
-              <a:t>9/8/2020</a:t>
+              <a:t>9/9/2020</a:t>
             </a:fld>
             <a:endParaRPr lang="en-US"/>
           </a:p>
@@ -780,7 +785,7 @@
           <a:p>
             <a:fld id="{3F5CFE33-0AFF-40E2-955F-FBA2E212049C}" type="datetimeFigureOut">
               <a:rPr lang="en-US" smtClean="0"/>
-              <a:t>9/8/2020</a:t>
+              <a:t>9/9/2020</a:t>
             </a:fld>
             <a:endParaRPr lang="en-US"/>
           </a:p>
@@ -1026,7 +1031,7 @@
           <a:p>
             <a:fld id="{3F5CFE33-0AFF-40E2-955F-FBA2E212049C}" type="datetimeFigureOut">
               <a:rPr lang="en-US" smtClean="0"/>
-              <a:t>9/8/2020</a:t>
+              <a:t>9/9/2020</a:t>
             </a:fld>
             <a:endParaRPr lang="en-US"/>
           </a:p>
@@ -1258,7 +1263,7 @@
           <a:p>
             <a:fld id="{3F5CFE33-0AFF-40E2-955F-FBA2E212049C}" type="datetimeFigureOut">
               <a:rPr lang="en-US" smtClean="0"/>
-              <a:t>9/8/2020</a:t>
+              <a:t>9/9/2020</a:t>
             </a:fld>
             <a:endParaRPr lang="en-US"/>
           </a:p>
@@ -1625,7 +1630,7 @@
           <a:p>
             <a:fld id="{3F5CFE33-0AFF-40E2-955F-FBA2E212049C}" type="datetimeFigureOut">
               <a:rPr lang="en-US" smtClean="0"/>
-              <a:t>9/8/2020</a:t>
+              <a:t>9/9/2020</a:t>
             </a:fld>
             <a:endParaRPr lang="en-US"/>
           </a:p>
@@ -1743,7 +1748,7 @@
           <a:p>
             <a:fld id="{3F5CFE33-0AFF-40E2-955F-FBA2E212049C}" type="datetimeFigureOut">
               <a:rPr lang="en-US" smtClean="0"/>
-              <a:t>9/8/2020</a:t>
+              <a:t>9/9/2020</a:t>
             </a:fld>
             <a:endParaRPr lang="en-US"/>
           </a:p>
@@ -1838,7 +1843,7 @@
           <a:p>
             <a:fld id="{3F5CFE33-0AFF-40E2-955F-FBA2E212049C}" type="datetimeFigureOut">
               <a:rPr lang="en-US" smtClean="0"/>
-              <a:t>9/8/2020</a:t>
+              <a:t>9/9/2020</a:t>
             </a:fld>
             <a:endParaRPr lang="en-US"/>
           </a:p>
@@ -2115,7 +2120,7 @@
           <a:p>
             <a:fld id="{3F5CFE33-0AFF-40E2-955F-FBA2E212049C}" type="datetimeFigureOut">
               <a:rPr lang="en-US" smtClean="0"/>
-              <a:t>9/8/2020</a:t>
+              <a:t>9/9/2020</a:t>
             </a:fld>
             <a:endParaRPr lang="en-US"/>
           </a:p>
@@ -2368,7 +2373,7 @@
           <a:p>
             <a:fld id="{3F5CFE33-0AFF-40E2-955F-FBA2E212049C}" type="datetimeFigureOut">
               <a:rPr lang="en-US" smtClean="0"/>
-              <a:t>9/8/2020</a:t>
+              <a:t>9/9/2020</a:t>
             </a:fld>
             <a:endParaRPr lang="en-US"/>
           </a:p>
@@ -2581,7 +2586,7 @@
           <a:p>
             <a:fld id="{3F5CFE33-0AFF-40E2-955F-FBA2E212049C}" type="datetimeFigureOut">
               <a:rPr lang="en-US" smtClean="0"/>
-              <a:t>9/8/2020</a:t>
+              <a:t>9/9/2020</a:t>
             </a:fld>
             <a:endParaRPr lang="en-US"/>
           </a:p>
@@ -3306,7 +3311,21 @@
             </a:pPr>
             <a:r>
               <a:rPr lang="en-US" sz="2000" dirty="0" smtClean="0"/>
-              <a:t>// Headers for application-specific algorithm/data structure objects #include &lt;</a:t>
+              <a:t>// Headers for application-specific algorithm/data structure objects </a:t>
+            </a:r>
+            <a:endParaRPr lang="en-US" sz="2000" dirty="0" smtClean="0"/>
+          </a:p>
+          <a:p>
+            <a:pPr marL="0" indent="0">
+              <a:buNone/>
+            </a:pPr>
+            <a:r>
+              <a:rPr lang="en-US" sz="2000" dirty="0" smtClean="0"/>
+              <a:t>#</a:t>
+            </a:r>
+            <a:r>
+              <a:rPr lang="en-US" sz="2000" dirty="0" smtClean="0"/>
+              <a:t>include &lt;</a:t>
             </a:r>
             <a:r>
               <a:rPr lang="en-US" sz="2000" dirty="0" err="1" smtClean="0"/>
@@ -3504,7 +3523,7 @@
         </p:blipFill>
         <p:spPr>
           <a:xfrm>
-            <a:off x="565485" y="1690688"/>
+            <a:off x="651622" y="1690688"/>
             <a:ext cx="11036286" cy="4052386"/>
           </a:xfrm>
           <a:prstGeom prst="rect">
@@ -3577,7 +3596,7 @@
         </p:nvSpPr>
         <p:spPr>
           <a:xfrm>
-            <a:off x="5010884" y="1842877"/>
+            <a:off x="5010884" y="1718131"/>
             <a:ext cx="6733261" cy="5139869"/>
           </a:xfrm>
           <a:prstGeom prst="rect">
@@ -3613,23 +3632,15 @@
             </a:pPr>
             <a:r>
               <a:rPr lang="en-US" sz="2400" dirty="0" smtClean="0"/>
-              <a:t>“We take the case of impulsively started cylinder in a quiescent flow to demonstrate the momentum-conservation properties of our method. A cylinder of diameter D </a:t>
+              <a:t>“We take the case of impulsively started cylinder in a quiescent flow to demonstrate the momentum-conservation properties of our method. A cylinder of diameter D = 1 m is </a:t>
             </a:r>
             <a:r>
               <a:rPr lang="en-US" sz="2400" dirty="0" smtClean="0"/>
-              <a:t>= </a:t>
+              <a:t>placed at </a:t>
             </a:r>
             <a:r>
               <a:rPr lang="en-US" sz="2400" dirty="0" smtClean="0"/>
-              <a:t>1 m is placed the center of a periodic domain of size 32 m x 16 </a:t>
-            </a:r>
-            <a:r>
-              <a:rPr lang="en-US" sz="2400" dirty="0" smtClean="0"/>
-              <a:t>m at </a:t>
-            </a:r>
-            <a:r>
-              <a:rPr lang="en-US" sz="2400" dirty="0" smtClean="0"/>
-              <a:t>time t </a:t>
+              <a:t>the center of a periodic domain of size 32 m x 16 m at time t </a:t>
             </a:r>
             <a:r>
               <a:rPr lang="en-US" sz="2400" dirty="0"/>
@@ -4946,7 +4957,12 @@
             <p:ph type="title"/>
           </p:nvPr>
         </p:nvSpPr>
-        <p:spPr/>
+        <p:spPr>
+          <a:xfrm>
+            <a:off x="644769" y="224448"/>
+            <a:ext cx="10515600" cy="1325563"/>
+          </a:xfrm>
+        </p:spPr>
         <p:txBody>
           <a:bodyPr/>
           <a:lstStyle/>
@@ -5316,7 +5332,7 @@
         </p:blipFill>
         <p:spPr>
           <a:xfrm>
-            <a:off x="1840330" y="1619250"/>
+            <a:off x="1952625" y="1452196"/>
             <a:ext cx="8286750" cy="5238750"/>
           </a:xfrm>
           <a:prstGeom prst="rect">
@@ -5856,7 +5872,7 @@
         </p:blipFill>
         <p:spPr>
           <a:xfrm>
-            <a:off x="3340111" y="3721209"/>
+            <a:off x="3202076" y="3665919"/>
             <a:ext cx="5787847" cy="2864776"/>
           </a:xfrm>
           <a:prstGeom prst="rect">

</xml_diff>